<commit_message>
final presentation and colab implementation
</commit_message>
<xml_diff>
--- a/docs/module_presentation.pptx
+++ b/docs/module_presentation.pptx
@@ -3346,8 +3346,8 @@
         </p:nvSpPr>
         <p:spPr>
           <a:xfrm>
-            <a:off x="571499" y="2155336"/>
-            <a:ext cx="9818714" cy="1261884"/>
+            <a:off x="411479" y="2555386"/>
+            <a:ext cx="11155618" cy="1138773"/>
           </a:xfrm>
           <a:prstGeom prst="rect">
             <a:avLst/>
@@ -3361,34 +3361,44 @@
           <a:lstStyle/>
           <a:p>
             <a:r>
-              <a:rPr lang="en-US" sz="4800" dirty="0">
-                <a:latin typeface=""/>
+              <a:rPr lang="en-US" sz="4400" dirty="0">
+                <a:latin typeface="Menlo" panose="020B0609030804020204" pitchFamily="49" charset="0"/>
+                <a:ea typeface="Menlo" panose="020B0609030804020204" pitchFamily="49" charset="0"/>
+                <a:cs typeface="Menlo" panose="020B0609030804020204" pitchFamily="49" charset="0"/>
               </a:rPr>
               <a:t>Python module </a:t>
             </a:r>
-            <a:endParaRPr lang="en-US" sz="2800" dirty="0">
-              <a:latin typeface=""/>
+            <a:endParaRPr lang="en-US" sz="2400" dirty="0">
+              <a:latin typeface="Menlo" panose="020B0609030804020204" pitchFamily="49" charset="0"/>
+              <a:ea typeface="Menlo" panose="020B0609030804020204" pitchFamily="49" charset="0"/>
+              <a:cs typeface="Menlo" panose="020B0609030804020204" pitchFamily="49" charset="0"/>
             </a:endParaRPr>
           </a:p>
           <a:p>
             <a:r>
-              <a:rPr lang="en-US" sz="2800" dirty="0">
-                <a:latin typeface=""/>
+              <a:rPr lang="en-US" sz="2400" dirty="0">
+                <a:latin typeface="Menlo" panose="020B0609030804020204" pitchFamily="49" charset="0"/>
+                <a:ea typeface="Menlo" panose="020B0609030804020204" pitchFamily="49" charset="0"/>
+                <a:cs typeface="Menlo" panose="020B0609030804020204" pitchFamily="49" charset="0"/>
               </a:rPr>
               <a:t>to process FISH (</a:t>
             </a:r>
             <a:r>
-              <a:rPr lang="en-US" sz="2800" dirty="0">
+              <a:rPr lang="en-US" sz="2400" dirty="0">
                 <a:solidFill>
                   <a:srgbClr val="00B0F0"/>
                 </a:solidFill>
-                <a:latin typeface=""/>
+                <a:latin typeface="Menlo" panose="020B0609030804020204" pitchFamily="49" charset="0"/>
+                <a:ea typeface="Menlo" panose="020B0609030804020204" pitchFamily="49" charset="0"/>
+                <a:cs typeface="Menlo" panose="020B0609030804020204" pitchFamily="49" charset="0"/>
               </a:rPr>
               <a:t>Fluorescence In Situ Hybridization</a:t>
             </a:r>
             <a:r>
-              <a:rPr lang="en-US" sz="2800" dirty="0">
-                <a:latin typeface=""/>
+              <a:rPr lang="en-US" sz="2400" dirty="0">
+                <a:latin typeface="Menlo" panose="020B0609030804020204" pitchFamily="49" charset="0"/>
+                <a:ea typeface="Menlo" panose="020B0609030804020204" pitchFamily="49" charset="0"/>
+                <a:cs typeface="Menlo" panose="020B0609030804020204" pitchFamily="49" charset="0"/>
               </a:rPr>
               <a:t>) images</a:t>
             </a:r>
@@ -3409,8 +3419,8 @@
         </p:nvSpPr>
         <p:spPr>
           <a:xfrm>
-            <a:off x="10493037" y="5788240"/>
-            <a:ext cx="1370953" cy="646331"/>
+            <a:off x="10024407" y="5673940"/>
+            <a:ext cx="1997663" cy="646331"/>
           </a:xfrm>
           <a:prstGeom prst="rect">
             <a:avLst/>
@@ -3428,6 +3438,9 @@
                 <a:solidFill>
                   <a:schemeClr val="accent2"/>
                 </a:solidFill>
+                <a:latin typeface="Menlo" panose="020B0609030804020204" pitchFamily="49" charset="0"/>
+                <a:ea typeface="Menlo" panose="020B0609030804020204" pitchFamily="49" charset="0"/>
+                <a:cs typeface="Menlo" panose="020B0609030804020204" pitchFamily="49" charset="0"/>
               </a:rPr>
               <a:t>Luis Aguilera</a:t>
             </a:r>
@@ -3438,6 +3451,9 @@
                 <a:solidFill>
                   <a:schemeClr val="accent2"/>
                 </a:solidFill>
+                <a:latin typeface="Menlo" panose="020B0609030804020204" pitchFamily="49" charset="0"/>
+                <a:ea typeface="Menlo" panose="020B0609030804020204" pitchFamily="49" charset="0"/>
+                <a:cs typeface="Menlo" panose="020B0609030804020204" pitchFamily="49" charset="0"/>
               </a:rPr>
               <a:t>Joshua Cook</a:t>
             </a:r>
@@ -3489,7 +3505,7 @@
         <p:spPr>
           <a:xfrm>
             <a:off x="285135" y="393290"/>
-            <a:ext cx="1788695" cy="523220"/>
+            <a:ext cx="2348720" cy="523220"/>
           </a:xfrm>
           <a:prstGeom prst="rect">
             <a:avLst/>
@@ -3503,7 +3519,11 @@
           <a:lstStyle/>
           <a:p>
             <a:r>
-              <a:rPr lang="en-US" sz="2800" dirty="0"/>
+              <a:rPr lang="en-US" sz="2800" dirty="0">
+                <a:latin typeface="Menlo" panose="020B0609030804020204" pitchFamily="49" charset="0"/>
+                <a:ea typeface="Menlo" panose="020B0609030804020204" pitchFamily="49" charset="0"/>
+                <a:cs typeface="Menlo" panose="020B0609030804020204" pitchFamily="49" charset="0"/>
+              </a:rPr>
               <a:t>Motivation</a:t>
             </a:r>
           </a:p>
@@ -3523,8 +3543,8 @@
         </p:nvSpPr>
         <p:spPr>
           <a:xfrm>
-            <a:off x="1805940" y="982176"/>
-            <a:ext cx="10218420" cy="4893647"/>
+            <a:off x="1170632" y="2030339"/>
+            <a:ext cx="11021368" cy="3539430"/>
           </a:xfrm>
           <a:prstGeom prst="rect">
             <a:avLst/>
@@ -3538,16 +3558,96 @@
           <a:lstStyle/>
           <a:p>
             <a:pPr marL="342900" indent="-342900">
-              <a:buFont typeface="Arial" panose="020B0604020202020204" pitchFamily="34" charset="0"/>
-              <a:buChar char="•"/>
+              <a:buFontTx/>
+              <a:buChar char="-"/>
             </a:pPr>
             <a:r>
-              <a:rPr lang="en-US" sz="2400" dirty="0"/>
-              <a:t>Extracting quantitative data from FISH images.</a:t>
-            </a:r>
-          </a:p>
-          <a:p>
-            <a:endParaRPr lang="en-US" sz="2400" dirty="0"/>
+              <a:rPr lang="en-US" sz="2000" dirty="0">
+                <a:latin typeface="Menlo" panose="020B0609030804020204" pitchFamily="49" charset="0"/>
+                <a:ea typeface="Menlo" panose="020B0609030804020204" pitchFamily="49" charset="0"/>
+                <a:cs typeface="Menlo" panose="020B0609030804020204" pitchFamily="49" charset="0"/>
+              </a:rPr>
+              <a:t>Multi-step process. (Segmentation, spot detection, quantification).</a:t>
+            </a:r>
+          </a:p>
+          <a:p>
+            <a:pPr marL="742950" lvl="1" indent="-285750">
+              <a:buFontTx/>
+              <a:buChar char="-"/>
+            </a:pPr>
+            <a:r>
+              <a:rPr lang="en-US" sz="2000" dirty="0">
+                <a:solidFill>
+                  <a:srgbClr val="0070C0"/>
+                </a:solidFill>
+                <a:latin typeface="Menlo" panose="020B0609030804020204" pitchFamily="49" charset="0"/>
+                <a:ea typeface="Menlo" panose="020B0609030804020204" pitchFamily="49" charset="0"/>
+                <a:cs typeface="Menlo" panose="020B0609030804020204" pitchFamily="49" charset="0"/>
+              </a:rPr>
+              <a:t>Requires a skilled user.</a:t>
+            </a:r>
+          </a:p>
+          <a:p>
+            <a:pPr marL="742950" lvl="1" indent="-285750">
+              <a:buFontTx/>
+              <a:buChar char="-"/>
+            </a:pPr>
+            <a:r>
+              <a:rPr lang="en-US" sz="2000" dirty="0">
+                <a:solidFill>
+                  <a:srgbClr val="0070C0"/>
+                </a:solidFill>
+                <a:latin typeface="Menlo" panose="020B0609030804020204" pitchFamily="49" charset="0"/>
+                <a:ea typeface="Menlo" panose="020B0609030804020204" pitchFamily="49" charset="0"/>
+                <a:cs typeface="Menlo" panose="020B0609030804020204" pitchFamily="49" charset="0"/>
+              </a:rPr>
+              <a:t>Labor intensive. </a:t>
+            </a:r>
+          </a:p>
+          <a:p>
+            <a:pPr marL="742950" lvl="1" indent="-285750">
+              <a:buFontTx/>
+              <a:buChar char="-"/>
+            </a:pPr>
+            <a:r>
+              <a:rPr lang="en-US" sz="2000" dirty="0">
+                <a:solidFill>
+                  <a:srgbClr val="0070C0"/>
+                </a:solidFill>
+                <a:latin typeface="Menlo" panose="020B0609030804020204" pitchFamily="49" charset="0"/>
+                <a:ea typeface="Menlo" panose="020B0609030804020204" pitchFamily="49" charset="0"/>
+                <a:cs typeface="Menlo" panose="020B0609030804020204" pitchFamily="49" charset="0"/>
+              </a:rPr>
+              <a:t>Multiple steps require user input (to select thresholds).</a:t>
+            </a:r>
+          </a:p>
+          <a:p>
+            <a:pPr marL="742950" lvl="1" indent="-285750">
+              <a:buFontTx/>
+              <a:buChar char="-"/>
+            </a:pPr>
+            <a:r>
+              <a:rPr lang="en-US" sz="2000" dirty="0">
+                <a:solidFill>
+                  <a:srgbClr val="0070C0"/>
+                </a:solidFill>
+                <a:latin typeface="Menlo" panose="020B0609030804020204" pitchFamily="49" charset="0"/>
+                <a:ea typeface="Menlo" panose="020B0609030804020204" pitchFamily="49" charset="0"/>
+                <a:cs typeface="Menlo" panose="020B0609030804020204" pitchFamily="49" charset="0"/>
+              </a:rPr>
+              <a:t>User-to-user variability.</a:t>
+            </a:r>
+          </a:p>
+          <a:p>
+            <a:pPr marL="742950" lvl="1" indent="-285750">
+              <a:buFontTx/>
+              <a:buChar char="-"/>
+            </a:pPr>
+            <a:endParaRPr lang="en-US" sz="2000" dirty="0">
+              <a:latin typeface="Menlo" panose="020B0609030804020204" pitchFamily="49" charset="0"/>
+              <a:ea typeface="Menlo" panose="020B0609030804020204" pitchFamily="49" charset="0"/>
+              <a:cs typeface="Menlo" panose="020B0609030804020204" pitchFamily="49" charset="0"/>
+            </a:endParaRPr>
           </a:p>
           <a:p>
             <a:pPr marL="285750" indent="-285750">
@@ -3555,8 +3655,12 @@
               <a:buChar char="-"/>
             </a:pPr>
             <a:r>
-              <a:rPr lang="en-US" sz="2400" dirty="0"/>
-              <a:t>Multi-step process. (Segmentation, spot detection, quantification).</a:t>
+              <a:rPr lang="en-US" sz="2000" dirty="0">
+                <a:latin typeface="Menlo" panose="020B0609030804020204" pitchFamily="49" charset="0"/>
+                <a:ea typeface="Menlo" panose="020B0609030804020204" pitchFamily="49" charset="0"/>
+                <a:cs typeface="Menlo" panose="020B0609030804020204" pitchFamily="49" charset="0"/>
+              </a:rPr>
+              <a:t>Large and complex datasets that are:</a:t>
             </a:r>
           </a:p>
           <a:p>
@@ -3565,12 +3669,15 @@
               <a:buChar char="-"/>
             </a:pPr>
             <a:r>
-              <a:rPr lang="en-US" sz="2400" dirty="0">
+              <a:rPr lang="en-US" sz="2000" dirty="0">
                 <a:solidFill>
                   <a:srgbClr val="0070C0"/>
                 </a:solidFill>
-              </a:rPr>
-              <a:t>Requires a skilled user.</a:t>
+                <a:latin typeface="Menlo" panose="020B0609030804020204" pitchFamily="49" charset="0"/>
+                <a:ea typeface="Menlo" panose="020B0609030804020204" pitchFamily="49" charset="0"/>
+                <a:cs typeface="Menlo" panose="020B0609030804020204" pitchFamily="49" charset="0"/>
+              </a:rPr>
+              <a:t>Difficult to transfer data between computers (local/remote).</a:t>
             </a:r>
           </a:p>
           <a:p>
@@ -3579,12 +3686,15 @@
               <a:buChar char="-"/>
             </a:pPr>
             <a:r>
-              <a:rPr lang="en-US" sz="2400" dirty="0">
+              <a:rPr lang="en-US" sz="2000" dirty="0">
                 <a:solidFill>
                   <a:srgbClr val="0070C0"/>
                 </a:solidFill>
-              </a:rPr>
-              <a:t>Labor intensive. </a:t>
+                <a:latin typeface="Menlo" panose="020B0609030804020204" pitchFamily="49" charset="0"/>
+                <a:ea typeface="Menlo" panose="020B0609030804020204" pitchFamily="49" charset="0"/>
+                <a:cs typeface="Menlo" panose="020B0609030804020204" pitchFamily="49" charset="0"/>
+              </a:rPr>
+              <a:t>Difficult to interpret.</a:t>
             </a:r>
           </a:p>
           <a:p>
@@ -3593,83 +3703,13 @@
               <a:buChar char="-"/>
             </a:pPr>
             <a:r>
-              <a:rPr lang="en-US" sz="2400" dirty="0">
+              <a:rPr lang="en-US" sz="2000" dirty="0">
                 <a:solidFill>
                   <a:srgbClr val="0070C0"/>
                 </a:solidFill>
-              </a:rPr>
-              <a:t>Multiple steps require user input (to select thresholds).</a:t>
-            </a:r>
-          </a:p>
-          <a:p>
-            <a:pPr marL="742950" lvl="1" indent="-285750">
-              <a:buFontTx/>
-              <a:buChar char="-"/>
-            </a:pPr>
-            <a:r>
-              <a:rPr lang="en-US" sz="2400" dirty="0">
-                <a:solidFill>
-                  <a:srgbClr val="0070C0"/>
-                </a:solidFill>
-              </a:rPr>
-              <a:t>User-to-user variability.</a:t>
-            </a:r>
-          </a:p>
-          <a:p>
-            <a:pPr marL="742950" lvl="1" indent="-285750">
-              <a:buFontTx/>
-              <a:buChar char="-"/>
-            </a:pPr>
-            <a:endParaRPr lang="en-US" sz="2400" dirty="0"/>
-          </a:p>
-          <a:p>
-            <a:pPr marL="285750" indent="-285750">
-              <a:buFontTx/>
-              <a:buChar char="-"/>
-            </a:pPr>
-            <a:r>
-              <a:rPr lang="en-US" sz="2400" dirty="0"/>
-              <a:t>Large and complex datasets that are:</a:t>
-            </a:r>
-          </a:p>
-          <a:p>
-            <a:pPr marL="742950" lvl="1" indent="-285750">
-              <a:buFontTx/>
-              <a:buChar char="-"/>
-            </a:pPr>
-            <a:r>
-              <a:rPr lang="en-US" sz="2400" dirty="0">
-                <a:solidFill>
-                  <a:srgbClr val="0070C0"/>
-                </a:solidFill>
-              </a:rPr>
-              <a:t>Difficult to store and transfer data between computers (local and servers).</a:t>
-            </a:r>
-          </a:p>
-          <a:p>
-            <a:pPr marL="742950" lvl="1" indent="-285750">
-              <a:buFontTx/>
-              <a:buChar char="-"/>
-            </a:pPr>
-            <a:r>
-              <a:rPr lang="en-US" sz="2400" dirty="0">
-                <a:solidFill>
-                  <a:srgbClr val="0070C0"/>
-                </a:solidFill>
-              </a:rPr>
-              <a:t>Difficult to interpret.</a:t>
-            </a:r>
-          </a:p>
-          <a:p>
-            <a:pPr marL="742950" lvl="1" indent="-285750">
-              <a:buFontTx/>
-              <a:buChar char="-"/>
-            </a:pPr>
-            <a:r>
-              <a:rPr lang="en-US" sz="2400" dirty="0">
-                <a:solidFill>
-                  <a:srgbClr val="0070C0"/>
-                </a:solidFill>
+                <a:latin typeface="Menlo" panose="020B0609030804020204" pitchFamily="49" charset="0"/>
+                <a:ea typeface="Menlo" panose="020B0609030804020204" pitchFamily="49" charset="0"/>
+                <a:cs typeface="Menlo" panose="020B0609030804020204" pitchFamily="49" charset="0"/>
               </a:rPr>
               <a:t>Difficult to apply (new/retrospective) changes.</a:t>
             </a:r>
@@ -3697,7 +3737,7 @@
         </p:nvGrpSpPr>
         <p:grpSpPr>
           <a:xfrm>
-            <a:off x="541795" y="2030339"/>
+            <a:off x="324625" y="2030339"/>
             <a:ext cx="914400" cy="2997080"/>
             <a:chOff x="342900" y="1481699"/>
             <a:chExt cx="914400" cy="2997080"/>
@@ -3805,6 +3845,49 @@
           </p:spPr>
         </p:pic>
       </p:grpSp>
+      <p:sp>
+        <p:nvSpPr>
+          <p:cNvPr id="11" name="TextBox 10">
+            <a:extLst>
+              <a:ext uri="{FF2B5EF4-FFF2-40B4-BE49-F238E27FC236}">
+                <a16:creationId xmlns:a16="http://schemas.microsoft.com/office/drawing/2014/main" id="{BBE75135-C608-4941-BFAF-7DEE6050D43B}"/>
+              </a:ext>
+            </a:extLst>
+          </p:cNvPr>
+          <p:cNvSpPr txBox="1"/>
+          <p:nvPr/>
+        </p:nvSpPr>
+        <p:spPr>
+          <a:xfrm>
+            <a:off x="324625" y="1008929"/>
+            <a:ext cx="9206578" cy="461665"/>
+          </a:xfrm>
+          <a:prstGeom prst="rect">
+            <a:avLst/>
+          </a:prstGeom>
+          <a:noFill/>
+        </p:spPr>
+        <p:txBody>
+          <a:bodyPr wrap="square">
+            <a:spAutoFit/>
+          </a:bodyPr>
+          <a:lstStyle/>
+          <a:p>
+            <a:pPr marL="342900" indent="-342900">
+              <a:buFont typeface="Arial" panose="020B0604020202020204" pitchFamily="34" charset="0"/>
+              <a:buChar char="•"/>
+            </a:pPr>
+            <a:r>
+              <a:rPr lang="en-US" sz="2400" dirty="0">
+                <a:latin typeface="Menlo" panose="020B0609030804020204" pitchFamily="49" charset="0"/>
+                <a:ea typeface="Menlo" panose="020B0609030804020204" pitchFamily="49" charset="0"/>
+                <a:cs typeface="Menlo" panose="020B0609030804020204" pitchFamily="49" charset="0"/>
+              </a:rPr>
+              <a:t>Extracting quantitative data from FISH images.</a:t>
+            </a:r>
+          </a:p>
+        </p:txBody>
+      </p:sp>
     </p:spTree>
     <p:extLst>
       <p:ext uri="{BB962C8B-B14F-4D97-AF65-F5344CB8AC3E}">
@@ -4082,7 +4165,7 @@
         <p:spPr>
           <a:xfrm>
             <a:off x="285135" y="393290"/>
-            <a:ext cx="2782108" cy="523220"/>
+            <a:ext cx="3863558" cy="523220"/>
           </a:xfrm>
           <a:prstGeom prst="rect">
             <a:avLst/>
@@ -4096,7 +4179,11 @@
           <a:lstStyle/>
           <a:p>
             <a:r>
-              <a:rPr lang="en-US" sz="2800" dirty="0"/>
+              <a:rPr lang="en-US" sz="2800" dirty="0">
+                <a:latin typeface="Menlo" panose="020B0609030804020204" pitchFamily="49" charset="0"/>
+                <a:ea typeface="Menlo" panose="020B0609030804020204" pitchFamily="49" charset="0"/>
+                <a:cs typeface="Menlo" panose="020B0609030804020204" pitchFamily="49" charset="0"/>
+              </a:rPr>
               <a:t>Code architecture</a:t>
             </a:r>
           </a:p>
@@ -7634,7 +7721,7 @@
         <p:spPr>
           <a:xfrm>
             <a:off x="285135" y="393290"/>
-            <a:ext cx="1798954" cy="523220"/>
+            <a:ext cx="2565126" cy="523220"/>
           </a:xfrm>
           <a:prstGeom prst="rect">
             <a:avLst/>
@@ -7648,7 +7735,11 @@
           <a:lstStyle/>
           <a:p>
             <a:r>
-              <a:rPr lang="en-US" sz="2800" dirty="0"/>
+              <a:rPr lang="en-US" sz="2800" dirty="0">
+                <a:latin typeface="Menlo" panose="020B0609030804020204" pitchFamily="49" charset="0"/>
+                <a:ea typeface="Menlo" panose="020B0609030804020204" pitchFamily="49" charset="0"/>
+                <a:cs typeface="Menlo" panose="020B0609030804020204" pitchFamily="49" charset="0"/>
+              </a:rPr>
               <a:t>Easy to use</a:t>
             </a:r>
           </a:p>
@@ -8779,7 +8870,7 @@
         <p:spPr>
           <a:xfrm>
             <a:off x="0" y="1065100"/>
-            <a:ext cx="2837893" cy="369332"/>
+            <a:ext cx="3680816" cy="369332"/>
           </a:xfrm>
           <a:prstGeom prst="rect">
             <a:avLst/>
@@ -8797,7 +8888,11 @@
               <a:buChar char="•"/>
             </a:pPr>
             <a:r>
-              <a:rPr lang="en-US" dirty="0"/>
+              <a:rPr lang="en-US" dirty="0">
+                <a:latin typeface="Menlo" panose="020B0609030804020204" pitchFamily="49" charset="0"/>
+                <a:ea typeface="Menlo" panose="020B0609030804020204" pitchFamily="49" charset="0"/>
+                <a:cs typeface="Menlo" panose="020B0609030804020204" pitchFamily="49" charset="0"/>
+              </a:rPr>
               <a:t>Experimental parameters</a:t>
             </a:r>
           </a:p>
@@ -8818,7 +8913,7 @@
         <p:spPr>
           <a:xfrm>
             <a:off x="-1" y="5077777"/>
-            <a:ext cx="2422458" cy="369332"/>
+            <a:ext cx="3262432" cy="369332"/>
           </a:xfrm>
           <a:prstGeom prst="rect">
             <a:avLst/>
@@ -8836,7 +8931,11 @@
               <a:buChar char="•"/>
             </a:pPr>
             <a:r>
-              <a:rPr lang="en-US" dirty="0"/>
+              <a:rPr lang="en-US" dirty="0">
+                <a:latin typeface="Menlo" panose="020B0609030804020204" pitchFamily="49" charset="0"/>
+                <a:ea typeface="Menlo" panose="020B0609030804020204" pitchFamily="49" charset="0"/>
+                <a:cs typeface="Menlo" panose="020B0609030804020204" pitchFamily="49" charset="0"/>
+              </a:rPr>
               <a:t>Running the pipeline</a:t>
             </a:r>
           </a:p>
@@ -8894,7 +8993,7 @@
         </p:blipFill>
         <p:spPr>
           <a:xfrm>
-            <a:off x="3650773" y="874893"/>
+            <a:off x="1576835" y="1296587"/>
             <a:ext cx="8256091" cy="1024950"/>
           </a:xfrm>
           <a:prstGeom prst="rect">
@@ -8917,7 +9016,7 @@
         <p:spPr>
           <a:xfrm>
             <a:off x="285135" y="393290"/>
-            <a:ext cx="2583400" cy="523220"/>
+            <a:ext cx="3863558" cy="523220"/>
           </a:xfrm>
           <a:prstGeom prst="rect">
             <a:avLst/>
@@ -8931,7 +9030,11 @@
           <a:lstStyle/>
           <a:p>
             <a:r>
-              <a:rPr lang="en-US" sz="2800" dirty="0"/>
+              <a:rPr lang="en-US" sz="2800" dirty="0">
+                <a:latin typeface="Menlo" panose="020B0609030804020204" pitchFamily="49" charset="0"/>
+                <a:ea typeface="Menlo" panose="020B0609030804020204" pitchFamily="49" charset="0"/>
+                <a:cs typeface="Menlo" panose="020B0609030804020204" pitchFamily="49" charset="0"/>
+              </a:rPr>
               <a:t>Easy to interpret</a:t>
             </a:r>
           </a:p>
@@ -8958,8 +9061,8 @@
         </p:blipFill>
         <p:spPr>
           <a:xfrm>
-            <a:off x="9145282" y="3303270"/>
-            <a:ext cx="2775755" cy="2548890"/>
+            <a:off x="10200427" y="654900"/>
+            <a:ext cx="1991573" cy="1828800"/>
           </a:xfrm>
           <a:prstGeom prst="rect">
             <a:avLst/>
@@ -8980,16 +9083,15 @@
           </p:cNvPicPr>
           <p:nvPr/>
         </p:nvPicPr>
-        <p:blipFill>
+        <p:blipFill rotWithShape="1">
           <a:blip r:embed="rId4"/>
-          <a:stretch>
-            <a:fillRect/>
-          </a:stretch>
+          <a:srcRect t="1041" b="14076"/>
+          <a:stretch/>
         </p:blipFill>
         <p:spPr>
           <a:xfrm>
-            <a:off x="3650774" y="2107589"/>
-            <a:ext cx="4966762" cy="4717132"/>
+            <a:off x="2683388" y="2755253"/>
+            <a:ext cx="4966762" cy="4004073"/>
           </a:xfrm>
           <a:prstGeom prst="rect">
             <a:avLst/>
@@ -9010,8 +9112,8 @@
         </p:nvSpPr>
         <p:spPr>
           <a:xfrm>
-            <a:off x="285135" y="1221575"/>
-            <a:ext cx="3433119" cy="369332"/>
+            <a:off x="285135" y="916510"/>
+            <a:ext cx="6051657" cy="369332"/>
           </a:xfrm>
           <a:prstGeom prst="rect">
             <a:avLst/>
@@ -9029,8 +9131,12 @@
               <a:buChar char="•"/>
             </a:pPr>
             <a:r>
-              <a:rPr lang="en-US" dirty="0"/>
-              <a:t>Data-frame with all information</a:t>
+              <a:rPr lang="en-US" dirty="0">
+                <a:latin typeface="Menlo" panose="020B0609030804020204" pitchFamily="49" charset="0"/>
+                <a:ea typeface="Menlo" panose="020B0609030804020204" pitchFamily="49" charset="0"/>
+                <a:cs typeface="Menlo" panose="020B0609030804020204" pitchFamily="49" charset="0"/>
+              </a:rPr>
+              <a:t>Data-frame with all information (Pandas)</a:t>
             </a:r>
           </a:p>
         </p:txBody>
@@ -9049,8 +9155,8 @@
         </p:nvSpPr>
         <p:spPr>
           <a:xfrm>
-            <a:off x="285135" y="4096823"/>
-            <a:ext cx="3126433" cy="369332"/>
+            <a:off x="285135" y="2385921"/>
+            <a:ext cx="6051657" cy="369332"/>
           </a:xfrm>
           <a:prstGeom prst="rect">
             <a:avLst/>
@@ -9068,8 +9174,12 @@
               <a:buChar char="•"/>
             </a:pPr>
             <a:r>
-              <a:rPr lang="en-US" dirty="0"/>
-              <a:t>Metadata for reproducibility</a:t>
+              <a:rPr lang="en-US" dirty="0">
+                <a:latin typeface="Menlo" panose="020B0609030804020204" pitchFamily="49" charset="0"/>
+                <a:ea typeface="Menlo" panose="020B0609030804020204" pitchFamily="49" charset="0"/>
+                <a:cs typeface="Menlo" panose="020B0609030804020204" pitchFamily="49" charset="0"/>
+              </a:rPr>
+              <a:t>Metadata for reproducibility (text file)</a:t>
             </a:r>
           </a:p>
         </p:txBody>
@@ -9305,7 +9415,7 @@
         <p:spPr>
           <a:xfrm>
             <a:off x="285135" y="477889"/>
-            <a:ext cx="3498113" cy="461665"/>
+            <a:ext cx="5086965" cy="523220"/>
           </a:xfrm>
           <a:prstGeom prst="rect">
             <a:avLst/>
@@ -9319,8 +9429,12 @@
           <a:lstStyle/>
           <a:p>
             <a:r>
-              <a:rPr lang="en-US" sz="2400" dirty="0"/>
-              <a:t>Connection to NAS. </a:t>
+              <a:rPr lang="en-US" sz="2800" dirty="0">
+                <a:latin typeface="Menlo" panose="020B0609030804020204" pitchFamily="49" charset="0"/>
+                <a:ea typeface="Menlo" panose="020B0609030804020204" pitchFamily="49" charset="0"/>
+                <a:cs typeface="Menlo" panose="020B0609030804020204" pitchFamily="49" charset="0"/>
+              </a:rPr>
+              <a:t>Connection to NAS </a:t>
             </a:r>
           </a:p>
         </p:txBody>
@@ -9347,7 +9461,7 @@
         </p:blipFill>
         <p:spPr>
           <a:xfrm>
-            <a:off x="3506531" y="2147099"/>
+            <a:off x="3506531" y="2364269"/>
             <a:ext cx="5193491" cy="1519860"/>
           </a:xfrm>
           <a:prstGeom prst="rect">
@@ -9383,7 +9497,7 @@
         </p:blipFill>
         <p:spPr>
           <a:xfrm rot="5400000">
-            <a:off x="5779721" y="3709226"/>
+            <a:off x="5779721" y="3926396"/>
             <a:ext cx="647112" cy="647112"/>
           </a:xfrm>
           <a:prstGeom prst="rect">
@@ -9541,8 +9655,8 @@
         </p:nvSpPr>
         <p:spPr>
           <a:xfrm>
-            <a:off x="285135" y="5400647"/>
-            <a:ext cx="9320818" cy="1200329"/>
+            <a:off x="285135" y="5645588"/>
+            <a:ext cx="9320818" cy="923330"/>
           </a:xfrm>
           <a:prstGeom prst="rect">
             <a:avLst/>
@@ -9555,8 +9669,16 @@
           </a:bodyPr>
           <a:lstStyle/>
           <a:p>
-            <a:r>
-              <a:rPr lang="en-US" sz="2400" dirty="0"/>
+            <a:pPr marL="342900" indent="-342900">
+              <a:buFont typeface="Arial" panose="020B0604020202020204" pitchFamily="34" charset="0"/>
+              <a:buChar char="•"/>
+            </a:pPr>
+            <a:r>
+              <a:rPr lang="en-US" dirty="0">
+                <a:latin typeface="Menlo" panose="020B0609030804020204" pitchFamily="49" charset="0"/>
+                <a:ea typeface="Menlo" panose="020B0609030804020204" pitchFamily="49" charset="0"/>
+                <a:cs typeface="Menlo" panose="020B0609030804020204" pitchFamily="49" charset="0"/>
+              </a:rPr>
               <a:t>Options to interact with NAS.</a:t>
             </a:r>
           </a:p>
@@ -9566,10 +9688,13 @@
               <a:buChar char="-"/>
             </a:pPr>
             <a:r>
-              <a:rPr lang="en-US" sz="2400" dirty="0">
+              <a:rPr lang="en-US" dirty="0">
                 <a:solidFill>
                   <a:srgbClr val="0070C0"/>
                 </a:solidFill>
+                <a:latin typeface="Menlo" panose="020B0609030804020204" pitchFamily="49" charset="0"/>
+                <a:ea typeface="Menlo" panose="020B0609030804020204" pitchFamily="49" charset="0"/>
+                <a:cs typeface="Menlo" panose="020B0609030804020204" pitchFamily="49" charset="0"/>
               </a:rPr>
               <a:t>Download images to local computer. </a:t>
             </a:r>
@@ -9580,31 +9705,44 @@
               <a:buChar char="-"/>
             </a:pPr>
             <a:r>
-              <a:rPr lang="en-US" sz="2400" dirty="0">
+              <a:rPr lang="en-US" dirty="0">
                 <a:solidFill>
                   <a:srgbClr val="0070C0"/>
                 </a:solidFill>
+                <a:latin typeface="Menlo" panose="020B0609030804020204" pitchFamily="49" charset="0"/>
+                <a:ea typeface="Menlo" panose="020B0609030804020204" pitchFamily="49" charset="0"/>
+                <a:cs typeface="Menlo" panose="020B0609030804020204" pitchFamily="49" charset="0"/>
               </a:rPr>
               <a:t>Write .</a:t>
             </a:r>
             <a:r>
-              <a:rPr lang="en-US" sz="2400" dirty="0" err="1">
+              <a:rPr lang="en-US" dirty="0" err="1">
                 <a:solidFill>
                   <a:srgbClr val="0070C0"/>
                 </a:solidFill>
+                <a:latin typeface="Menlo" panose="020B0609030804020204" pitchFamily="49" charset="0"/>
+                <a:ea typeface="Menlo" panose="020B0609030804020204" pitchFamily="49" charset="0"/>
+                <a:cs typeface="Menlo" panose="020B0609030804020204" pitchFamily="49" charset="0"/>
               </a:rPr>
               <a:t>tex</a:t>
             </a:r>
             <a:r>
-              <a:rPr lang="en-US" sz="2400" dirty="0">
+              <a:rPr lang="en-US" dirty="0">
                 <a:solidFill>
                   <a:srgbClr val="0070C0"/>
                 </a:solidFill>
+                <a:latin typeface="Menlo" panose="020B0609030804020204" pitchFamily="49" charset="0"/>
+                <a:ea typeface="Menlo" panose="020B0609030804020204" pitchFamily="49" charset="0"/>
+                <a:cs typeface="Menlo" panose="020B0609030804020204" pitchFamily="49" charset="0"/>
               </a:rPr>
               <a:t> and .csv files to NAS.</a:t>
             </a:r>
             <a:r>
-              <a:rPr lang="en-US" sz="2400" dirty="0"/>
+              <a:rPr lang="en-US" dirty="0">
+                <a:latin typeface="Menlo" panose="020B0609030804020204" pitchFamily="49" charset="0"/>
+                <a:ea typeface="Menlo" panose="020B0609030804020204" pitchFamily="49" charset="0"/>
+                <a:cs typeface="Menlo" panose="020B0609030804020204" pitchFamily="49" charset="0"/>
+              </a:rPr>
               <a:t> </a:t>
             </a:r>
           </a:p>
@@ -9696,8 +9834,8 @@
         </p:nvSpPr>
         <p:spPr>
           <a:xfrm>
-            <a:off x="809561" y="2722363"/>
-            <a:ext cx="2498313" cy="369332"/>
+            <a:off x="285135" y="1806987"/>
+            <a:ext cx="4099199" cy="369332"/>
           </a:xfrm>
           <a:prstGeom prst="rect">
             <a:avLst/>
@@ -9710,16 +9848,32 @@
           </a:bodyPr>
           <a:lstStyle/>
           <a:p>
-            <a:r>
-              <a:rPr lang="en-US" dirty="0"/>
+            <a:pPr marL="285750" indent="-285750">
+              <a:buFont typeface="Arial" panose="020B0604020202020204" pitchFamily="34" charset="0"/>
+              <a:buChar char="•"/>
+            </a:pPr>
+            <a:r>
+              <a:rPr lang="en-US" dirty="0">
+                <a:latin typeface="Menlo" panose="020B0609030804020204" pitchFamily="49" charset="0"/>
+                <a:ea typeface="Menlo" panose="020B0609030804020204" pitchFamily="49" charset="0"/>
+                <a:cs typeface="Menlo" panose="020B0609030804020204" pitchFamily="49" charset="0"/>
+              </a:rPr>
               <a:t>Configuration file (.</a:t>
             </a:r>
             <a:r>
-              <a:rPr lang="en-US" dirty="0" err="1"/>
+              <a:rPr lang="en-US" dirty="0" err="1">
+                <a:latin typeface="Menlo" panose="020B0609030804020204" pitchFamily="49" charset="0"/>
+                <a:ea typeface="Menlo" panose="020B0609030804020204" pitchFamily="49" charset="0"/>
+                <a:cs typeface="Menlo" panose="020B0609030804020204" pitchFamily="49" charset="0"/>
+              </a:rPr>
               <a:t>yaml</a:t>
             </a:r>
             <a:r>
-              <a:rPr lang="en-US" dirty="0"/>
+              <a:rPr lang="en-US" dirty="0">
+                <a:latin typeface="Menlo" panose="020B0609030804020204" pitchFamily="49" charset="0"/>
+                <a:ea typeface="Menlo" panose="020B0609030804020204" pitchFamily="49" charset="0"/>
+                <a:cs typeface="Menlo" panose="020B0609030804020204" pitchFamily="49" charset="0"/>
+              </a:rPr>
               <a:t>)</a:t>
             </a:r>
           </a:p>
@@ -9769,8 +9923,8 @@
         </p:nvSpPr>
         <p:spPr>
           <a:xfrm>
-            <a:off x="832485" y="2956590"/>
-            <a:ext cx="3498113" cy="461665"/>
+            <a:off x="605790" y="2737188"/>
+            <a:ext cx="6162675" cy="461665"/>
           </a:xfrm>
           <a:prstGeom prst="rect">
             <a:avLst/>
@@ -9788,8 +9942,33 @@
                 <a:solidFill>
                   <a:srgbClr val="FF0000"/>
                 </a:solidFill>
-              </a:rPr>
-              <a:t>Please try it by yourself!</a:t>
+                <a:latin typeface="Menlo" panose="020B0609030804020204" pitchFamily="49" charset="0"/>
+                <a:ea typeface="Menlo" panose="020B0609030804020204" pitchFamily="49" charset="0"/>
+                <a:cs typeface="Menlo" panose="020B0609030804020204" pitchFamily="49" charset="0"/>
+              </a:rPr>
+              <a:t>Try it in Google </a:t>
+            </a:r>
+            <a:r>
+              <a:rPr lang="en-US" sz="2400" dirty="0" err="1">
+                <a:solidFill>
+                  <a:srgbClr val="FF0000"/>
+                </a:solidFill>
+                <a:latin typeface="Menlo" panose="020B0609030804020204" pitchFamily="49" charset="0"/>
+                <a:ea typeface="Menlo" panose="020B0609030804020204" pitchFamily="49" charset="0"/>
+                <a:cs typeface="Menlo" panose="020B0609030804020204" pitchFamily="49" charset="0"/>
+              </a:rPr>
+              <a:t>Colab</a:t>
+            </a:r>
+            <a:r>
+              <a:rPr lang="en-US" sz="2400" dirty="0">
+                <a:solidFill>
+                  <a:srgbClr val="FF0000"/>
+                </a:solidFill>
+                <a:latin typeface="Menlo" panose="020B0609030804020204" pitchFamily="49" charset="0"/>
+                <a:ea typeface="Menlo" panose="020B0609030804020204" pitchFamily="49" charset="0"/>
+                <a:cs typeface="Menlo" panose="020B0609030804020204" pitchFamily="49" charset="0"/>
+              </a:rPr>
+              <a:t>!</a:t>
             </a:r>
           </a:p>
         </p:txBody>
@@ -9808,8 +9987,8 @@
         </p:nvSpPr>
         <p:spPr>
           <a:xfrm>
-            <a:off x="832485" y="3670577"/>
-            <a:ext cx="10527030" cy="400110"/>
+            <a:off x="605790" y="3501301"/>
+            <a:ext cx="10641330" cy="338554"/>
           </a:xfrm>
           <a:prstGeom prst="rect">
             <a:avLst/>
@@ -9823,15 +10002,27 @@
           <a:lstStyle/>
           <a:p>
             <a:r>
-              <a:rPr lang="en-US" sz="2000" dirty="0"/>
+              <a:rPr lang="en-US" sz="1600" dirty="0">
+                <a:latin typeface="Menlo" panose="020B0609030804020204" pitchFamily="49" charset="0"/>
+                <a:ea typeface="Menlo" panose="020B0609030804020204" pitchFamily="49" charset="0"/>
+                <a:cs typeface="Menlo" panose="020B0609030804020204" pitchFamily="49" charset="0"/>
+              </a:rPr>
               <a:t>https://</a:t>
             </a:r>
             <a:r>
-              <a:rPr lang="en-US" sz="2000" dirty="0" err="1"/>
+              <a:rPr lang="en-US" sz="1600" dirty="0" err="1">
+                <a:latin typeface="Menlo" panose="020B0609030804020204" pitchFamily="49" charset="0"/>
+                <a:ea typeface="Menlo" panose="020B0609030804020204" pitchFamily="49" charset="0"/>
+                <a:cs typeface="Menlo" panose="020B0609030804020204" pitchFamily="49" charset="0"/>
+              </a:rPr>
               <a:t>colab.research.google.com</a:t>
             </a:r>
             <a:r>
-              <a:rPr lang="en-US" sz="2000" dirty="0"/>
+              <a:rPr lang="en-US" sz="1600" dirty="0">
+                <a:latin typeface="Menlo" panose="020B0609030804020204" pitchFamily="49" charset="0"/>
+                <a:ea typeface="Menlo" panose="020B0609030804020204" pitchFamily="49" charset="0"/>
+                <a:cs typeface="Menlo" panose="020B0609030804020204" pitchFamily="49" charset="0"/>
+              </a:rPr>
               <a:t>/drive/1CQx4e5MQ0ZsZSQgqtLzVVh53dAg4uaQj?usp=sharing</a:t>
             </a:r>
           </a:p>

</xml_diff>